<commit_message>
Hil folder has been updated
</commit_message>
<xml_diff>
--- a/__Master-Abschlussarbeit.pptx
+++ b/__Master-Abschlussarbeit.pptx
@@ -278,7 +278,7 @@
               <a:pPr>
                 <a:defRPr/>
               </a:pPr>
-              <a:t>30.07.2018</a:t>
+              <a:t>31.07.2018</a:t>
             </a:fld>
             <a:endParaRPr lang="de-DE"/>
           </a:p>
@@ -464,7 +464,7 @@
               <a:pPr>
                 <a:defRPr/>
               </a:pPr>
-              <a:t>30.07.2018</a:t>
+              <a:t>31.07.2018</a:t>
             </a:fld>
             <a:endParaRPr lang="de-DE"/>
           </a:p>
@@ -1093,8 +1093,21 @@
           <a:p>
             <a:r>
               <a:rPr lang="de-DE" dirty="0"/>
-              <a:t>5) Bevor wir über die AA  sprechen, sollen wir zuerst die bestehende Host-Applikation beschreiben. Da die Auswertung des Ist-Zustands dient als Grundlage  für den Soll-Zustand.</a:t>
-            </a:r>
+              <a:t>5) Bevor wir über die AA  sprechen, sollen wir zuerst die bestehende Host-Applikation beschreiben. Da die Auswertung des Ist-Zustands dient als Grundlage  für den Soll-Zustand</a:t>
+            </a:r>
+            <a:r>
+              <a:rPr lang="de-DE" dirty="0" smtClean="0"/>
+              <a:t>. </a:t>
+            </a:r>
+            <a:r>
+              <a:rPr lang="de-DE" dirty="0" err="1" smtClean="0"/>
+              <a:t>ComStudio</a:t>
+            </a:r>
+            <a:r>
+              <a:rPr lang="de-DE" dirty="0" smtClean="0"/>
+              <a:t> ist..</a:t>
+            </a:r>
+            <a:endParaRPr lang="de-DE" dirty="0"/>
           </a:p>
           <a:p>
             <a:r>
@@ -3537,7 +3550,7 @@
               <a:pPr>
                 <a:defRPr/>
               </a:pPr>
-              <a:t>30.07.2018</a:t>
+              <a:t>31.07.2018</a:t>
             </a:fld>
             <a:endParaRPr lang="de-DE" dirty="0"/>
           </a:p>
@@ -4343,7 +4356,7 @@
               <a:pPr>
                 <a:defRPr/>
               </a:pPr>
-              <a:t>30.07.2018</a:t>
+              <a:t>31.07.2018</a:t>
             </a:fld>
             <a:endParaRPr lang="de-DE" dirty="0"/>
           </a:p>
@@ -4690,7 +4703,7 @@
               <a:pPr>
                 <a:defRPr/>
               </a:pPr>
-              <a:t>30.07.2018</a:t>
+              <a:t>31.07.2018</a:t>
             </a:fld>
             <a:endParaRPr lang="de-DE" dirty="0"/>
           </a:p>
@@ -5026,7 +5039,7 @@
               <a:pPr>
                 <a:defRPr/>
               </a:pPr>
-              <a:t>30.07.2018</a:t>
+              <a:t>31.07.2018</a:t>
             </a:fld>
             <a:endParaRPr lang="de-DE" dirty="0"/>
           </a:p>
@@ -5347,7 +5360,7 @@
               <a:pPr>
                 <a:defRPr/>
               </a:pPr>
-              <a:t>30.07.2018</a:t>
+              <a:t>31.07.2018</a:t>
             </a:fld>
             <a:endParaRPr lang="de-DE" dirty="0"/>
           </a:p>
@@ -5668,7 +5681,7 @@
               <a:pPr>
                 <a:defRPr/>
               </a:pPr>
-              <a:t>30.07.2018</a:t>
+              <a:t>31.07.2018</a:t>
             </a:fld>
             <a:endParaRPr lang="de-DE" dirty="0"/>
           </a:p>
@@ -6069,7 +6082,7 @@
               <a:pPr>
                 <a:defRPr/>
               </a:pPr>
-              <a:t>30.07.2018</a:t>
+              <a:t>31.07.2018</a:t>
             </a:fld>
             <a:endParaRPr lang="de-DE" dirty="0"/>
           </a:p>
@@ -6430,7 +6443,7 @@
               <a:pPr>
                 <a:defRPr/>
               </a:pPr>
-              <a:t>30.07.2018</a:t>
+              <a:t>31.07.2018</a:t>
             </a:fld>
             <a:endParaRPr lang="de-DE" dirty="0"/>
           </a:p>
@@ -6686,7 +6699,7 @@
               <a:pPr>
                 <a:defRPr/>
               </a:pPr>
-              <a:t>30.07.2018</a:t>
+              <a:t>31.07.2018</a:t>
             </a:fld>
             <a:endParaRPr lang="de-DE" dirty="0"/>
           </a:p>
@@ -7467,7 +7480,7 @@
               <a:pPr>
                 <a:defRPr/>
               </a:pPr>
-              <a:t>30.07.2018</a:t>
+              <a:t>31.07.2018</a:t>
             </a:fld>
             <a:endParaRPr lang="de-DE" dirty="0"/>
           </a:p>
@@ -7727,7 +7740,7 @@
               <a:pPr>
                 <a:defRPr/>
               </a:pPr>
-              <a:t>30.07.2018</a:t>
+              <a:t>31.07.2018</a:t>
             </a:fld>
             <a:endParaRPr lang="de-DE" dirty="0"/>
           </a:p>
@@ -8041,7 +8054,7 @@
               <a:pPr>
                 <a:defRPr/>
               </a:pPr>
-              <a:t>30.07.2018</a:t>
+              <a:t>31.07.2018</a:t>
             </a:fld>
             <a:endParaRPr lang="de-DE" dirty="0"/>
           </a:p>
@@ -8337,7 +8350,7 @@
               <a:pPr>
                 <a:defRPr/>
               </a:pPr>
-              <a:t>30.07.2018</a:t>
+              <a:t>31.07.2018</a:t>
             </a:fld>
             <a:endParaRPr lang="de-DE" dirty="0"/>
           </a:p>
@@ -8672,7 +8685,7 @@
               <a:pPr>
                 <a:defRPr/>
               </a:pPr>
-              <a:t>30.07.2018</a:t>
+              <a:t>31.07.2018</a:t>
             </a:fld>
             <a:endParaRPr lang="de-DE" dirty="0"/>
           </a:p>
@@ -8842,7 +8855,7 @@
               <a:pPr>
                 <a:defRPr/>
               </a:pPr>
-              <a:t>30.07.2018</a:t>
+              <a:t>31.07.2018</a:t>
             </a:fld>
             <a:endParaRPr lang="de-DE" dirty="0"/>
           </a:p>
@@ -9038,7 +9051,7 @@
               <a:pPr>
                 <a:defRPr/>
               </a:pPr>
-              <a:t>30.07.2018</a:t>
+              <a:t>31.07.2018</a:t>
             </a:fld>
             <a:endParaRPr lang="de-DE" dirty="0"/>
           </a:p>
@@ -9236,7 +9249,7 @@
               <a:pPr>
                 <a:defRPr/>
               </a:pPr>
-              <a:t>30.07.2018</a:t>
+              <a:t>31.07.2018</a:t>
             </a:fld>
             <a:endParaRPr lang="de-DE" dirty="0"/>
           </a:p>
@@ -9434,7 +9447,7 @@
               <a:pPr>
                 <a:defRPr/>
               </a:pPr>
-              <a:t>30.07.2018</a:t>
+              <a:t>31.07.2018</a:t>
             </a:fld>
             <a:endParaRPr lang="de-DE" dirty="0"/>
           </a:p>
@@ -9814,7 +9827,7 @@
               <a:pPr>
                 <a:defRPr/>
               </a:pPr>
-              <a:t>30.07.2018</a:t>
+              <a:t>31.07.2018</a:t>
             </a:fld>
             <a:endParaRPr lang="de-DE" dirty="0"/>
           </a:p>
@@ -10064,7 +10077,7 @@
               <a:pPr>
                 <a:defRPr/>
               </a:pPr>
-              <a:t>30.07.2018</a:t>
+              <a:t>31.07.2018</a:t>
             </a:fld>
             <a:endParaRPr lang="de-DE" dirty="0"/>
           </a:p>
@@ -10404,7 +10417,7 @@
               <a:pPr>
                 <a:defRPr/>
               </a:pPr>
-              <a:t>30.07.2018</a:t>
+              <a:t>31.07.2018</a:t>
             </a:fld>
             <a:endParaRPr lang="de-DE" dirty="0"/>
           </a:p>
@@ -10618,7 +10631,7 @@
               <a:pPr>
                 <a:defRPr/>
               </a:pPr>
-              <a:t>30.07.2018</a:t>
+              <a:t>31.07.2018</a:t>
             </a:fld>
             <a:endParaRPr lang="de-DE" dirty="0"/>
           </a:p>
@@ -10814,7 +10827,7 @@
               <a:pPr>
                 <a:defRPr/>
               </a:pPr>
-              <a:t>30.07.2018</a:t>
+              <a:t>31.07.2018</a:t>
             </a:fld>
             <a:endParaRPr lang="de-DE" dirty="0"/>
           </a:p>
@@ -11139,7 +11152,7 @@
               <a:pPr>
                 <a:defRPr/>
               </a:pPr>
-              <a:t>30.07.2018</a:t>
+              <a:t>31.07.2018</a:t>
             </a:fld>
             <a:endParaRPr lang="de-DE" dirty="0"/>
           </a:p>
@@ -11282,14 +11295,35 @@
             <a:pPr lvl="1"/>
             <a:r>
               <a:rPr lang="de-DE" dirty="0"/>
-              <a:t>Visuelle Informationen</a:t>
-            </a:r>
+              <a:t>Visuelle </a:t>
+            </a:r>
+            <a:r>
+              <a:rPr lang="de-DE" dirty="0" smtClean="0"/>
+              <a:t>Darstellung</a:t>
+            </a:r>
+            <a:endParaRPr lang="de-DE" dirty="0"/>
           </a:p>
           <a:p>
             <a:pPr lvl="1"/>
             <a:r>
-              <a:rPr lang="de-DE" dirty="0"/>
-              <a:t>protokollneutraler, einheitlicher Ansatz </a:t>
+              <a:rPr lang="de-DE" dirty="0" smtClean="0"/>
+              <a:t>P</a:t>
+            </a:r>
+            <a:r>
+              <a:rPr lang="de-DE" dirty="0" smtClean="0"/>
+              <a:t>rotokollneutraler</a:t>
+            </a:r>
+            <a:r>
+              <a:rPr lang="de-DE" dirty="0"/>
+              <a:t> </a:t>
+            </a:r>
+            <a:r>
+              <a:rPr lang="de-DE" dirty="0" smtClean="0"/>
+              <a:t>und  </a:t>
+            </a:r>
+            <a:r>
+              <a:rPr lang="de-DE" dirty="0"/>
+              <a:t>einheitlicher Ansatz </a:t>
             </a:r>
           </a:p>
           <a:p>
@@ -11364,7 +11398,7 @@
               <a:pPr>
                 <a:defRPr/>
               </a:pPr>
-              <a:t>30.07.2018</a:t>
+              <a:t>31.07.2018</a:t>
             </a:fld>
             <a:endParaRPr lang="de-DE" dirty="0"/>
           </a:p>
@@ -11632,7 +11666,7 @@
               <a:pPr>
                 <a:defRPr/>
               </a:pPr>
-              <a:t>30.07.2018</a:t>
+              <a:t>31.07.2018</a:t>
             </a:fld>
             <a:endParaRPr lang="de-DE" dirty="0"/>
           </a:p>
@@ -11838,7 +11872,7 @@
               <a:pPr>
                 <a:defRPr/>
               </a:pPr>
-              <a:t>30.07.2018</a:t>
+              <a:t>31.07.2018</a:t>
             </a:fld>
             <a:endParaRPr lang="de-DE" dirty="0"/>
           </a:p>
@@ -12056,7 +12090,7 @@
               <a:pPr>
                 <a:defRPr/>
               </a:pPr>
-              <a:t>30.07.2018</a:t>
+              <a:t>31.07.2018</a:t>
             </a:fld>
             <a:endParaRPr lang="de-DE" dirty="0"/>
           </a:p>
@@ -12137,6 +12171,10 @@
             <a:r>
               <a:rPr lang="de-DE" dirty="0" err="1"/>
               <a:t>Topologiemuster</a:t>
+            </a:r>
+            <a:r>
+              <a:rPr lang="de-DE" dirty="0"/>
+              <a:t/>
             </a:r>
             <a:br>
               <a:rPr lang="de-DE" dirty="0"/>
@@ -12314,7 +12352,7 @@
               <a:pPr>
                 <a:defRPr/>
               </a:pPr>
-              <a:t>30.07.2018</a:t>
+              <a:t>31.07.2018</a:t>
             </a:fld>
             <a:endParaRPr lang="de-DE" dirty="0"/>
           </a:p>
@@ -12395,6 +12433,10 @@
             <a:r>
               <a:rPr lang="de-DE" dirty="0" err="1"/>
               <a:t>Topologiemuster</a:t>
+            </a:r>
+            <a:r>
+              <a:rPr lang="de-DE" dirty="0"/>
+              <a:t/>
             </a:r>
             <a:br>
               <a:rPr lang="de-DE" dirty="0"/>
@@ -12646,7 +12688,7 @@
               <a:pPr>
                 <a:defRPr/>
               </a:pPr>
-              <a:t>30.07.2018</a:t>
+              <a:t>31.07.2018</a:t>
             </a:fld>
             <a:endParaRPr lang="de-DE" dirty="0"/>
           </a:p>

</xml_diff>